<commit_message>
Update doc/slides with ignoreEOF
</commit_message>
<xml_diff>
--- a/doc/PEMstr.pptx
+++ b/doc/PEMstr.pptx
@@ -217,7 +217,7 @@
           <a:p>
             <a:fld id="{537EE966-A6B0-5E48-A7C8-C62EAEE31F20}" type="datetimeFigureOut">
               <a:rPr lang="en-US" smtClean="0"/>
-              <a:t>4/10/13</a:t>
+              <a:t>5/16/13</a:t>
             </a:fld>
             <a:endParaRPr lang="en-US"/>
           </a:p>
@@ -1069,7 +1069,7 @@
             <a:fld id="{F40D0489-683B-434F-B481-40D7FA1B0BF3}" type="datetimeFigureOut">
               <a:rPr lang="en-US" smtClean="0"/>
               <a:pPr/>
-              <a:t>4/10/13</a:t>
+              <a:t>5/16/13</a:t>
             </a:fld>
             <a:endParaRPr lang="en-US"/>
           </a:p>
@@ -1241,7 +1241,7 @@
             <a:fld id="{F40D0489-683B-434F-B481-40D7FA1B0BF3}" type="datetimeFigureOut">
               <a:rPr lang="en-US" smtClean="0"/>
               <a:pPr/>
-              <a:t>4/10/13</a:t>
+              <a:t>5/16/13</a:t>
             </a:fld>
             <a:endParaRPr lang="en-US"/>
           </a:p>
@@ -1423,7 +1423,7 @@
             <a:fld id="{F40D0489-683B-434F-B481-40D7FA1B0BF3}" type="datetimeFigureOut">
               <a:rPr lang="en-US" smtClean="0"/>
               <a:pPr/>
-              <a:t>4/10/13</a:t>
+              <a:t>5/16/13</a:t>
             </a:fld>
             <a:endParaRPr lang="en-US"/>
           </a:p>
@@ -1595,7 +1595,7 @@
             <a:fld id="{F40D0489-683B-434F-B481-40D7FA1B0BF3}" type="datetimeFigureOut">
               <a:rPr lang="en-US" smtClean="0"/>
               <a:pPr/>
-              <a:t>4/10/13</a:t>
+              <a:t>5/16/13</a:t>
             </a:fld>
             <a:endParaRPr lang="en-US"/>
           </a:p>
@@ -1843,7 +1843,7 @@
             <a:fld id="{F40D0489-683B-434F-B481-40D7FA1B0BF3}" type="datetimeFigureOut">
               <a:rPr lang="en-US" smtClean="0"/>
               <a:pPr/>
-              <a:t>4/10/13</a:t>
+              <a:t>5/16/13</a:t>
             </a:fld>
             <a:endParaRPr lang="en-US"/>
           </a:p>
@@ -2133,7 +2133,7 @@
             <a:fld id="{F40D0489-683B-434F-B481-40D7FA1B0BF3}" type="datetimeFigureOut">
               <a:rPr lang="en-US" smtClean="0"/>
               <a:pPr/>
-              <a:t>4/10/13</a:t>
+              <a:t>5/16/13</a:t>
             </a:fld>
             <a:endParaRPr lang="en-US"/>
           </a:p>
@@ -2557,7 +2557,7 @@
             <a:fld id="{F40D0489-683B-434F-B481-40D7FA1B0BF3}" type="datetimeFigureOut">
               <a:rPr lang="en-US" smtClean="0"/>
               <a:pPr/>
-              <a:t>4/10/13</a:t>
+              <a:t>5/16/13</a:t>
             </a:fld>
             <a:endParaRPr lang="en-US"/>
           </a:p>
@@ -2677,7 +2677,7 @@
             <a:fld id="{F40D0489-683B-434F-B481-40D7FA1B0BF3}" type="datetimeFigureOut">
               <a:rPr lang="en-US" smtClean="0"/>
               <a:pPr/>
-              <a:t>4/10/13</a:t>
+              <a:t>5/16/13</a:t>
             </a:fld>
             <a:endParaRPr lang="en-US"/>
           </a:p>
@@ -2774,7 +2774,7 @@
             <a:fld id="{F40D0489-683B-434F-B481-40D7FA1B0BF3}" type="datetimeFigureOut">
               <a:rPr lang="en-US" smtClean="0"/>
               <a:pPr/>
-              <a:t>4/10/13</a:t>
+              <a:t>5/16/13</a:t>
             </a:fld>
             <a:endParaRPr lang="en-US"/>
           </a:p>
@@ -3053,7 +3053,7 @@
             <a:fld id="{F40D0489-683B-434F-B481-40D7FA1B0BF3}" type="datetimeFigureOut">
               <a:rPr lang="en-US" smtClean="0"/>
               <a:pPr/>
-              <a:t>4/10/13</a:t>
+              <a:t>5/16/13</a:t>
             </a:fld>
             <a:endParaRPr lang="en-US"/>
           </a:p>
@@ -3308,7 +3308,7 @@
             <a:fld id="{F40D0489-683B-434F-B481-40D7FA1B0BF3}" type="datetimeFigureOut">
               <a:rPr lang="en-US" smtClean="0"/>
               <a:pPr/>
-              <a:t>4/10/13</a:t>
+              <a:t>5/16/13</a:t>
             </a:fld>
             <a:endParaRPr lang="en-US"/>
           </a:p>
@@ -3523,7 +3523,7 @@
             <a:fld id="{F40D0489-683B-434F-B481-40D7FA1B0BF3}" type="datetimeFigureOut">
               <a:rPr lang="en-US" smtClean="0"/>
               <a:pPr/>
-              <a:t>4/10/13</a:t>
+              <a:t>5/16/13</a:t>
             </a:fld>
             <a:endParaRPr lang="en-US"/>
           </a:p>
@@ -11579,21 +11579,13 @@
           <a:p>
             <a:r>
               <a:rPr lang="en-US" sz="3000" dirty="0" smtClean="0"/>
-              <a:t>Size of queue before we send back </a:t>
-            </a:r>
+              <a:t>Size of queue before we send back pause</a:t>
+            </a:r>
+          </a:p>
+          <a:p>
             <a:r>
               <a:rPr lang="en-US" sz="3000" dirty="0" smtClean="0"/>
-              <a:t>pause</a:t>
-            </a:r>
-          </a:p>
-          <a:p>
-            <a:r>
-              <a:rPr lang="en-US" sz="3000" dirty="0" smtClean="0"/>
-              <a:t># of buffers used for multi-buffering reads</a:t>
-            </a:r>
-            <a:r>
-              <a:rPr lang="en-US" sz="3000" dirty="0" smtClean="0"/>
-              <a:t> </a:t>
+              <a:t># of buffers used for multi-buffering reads </a:t>
             </a:r>
             <a:endParaRPr lang="en-US" sz="3000" dirty="0"/>
           </a:p>
@@ -11843,7 +11835,29 @@
             </a:r>
             <a:r>
               <a:rPr lang="en-US" dirty="0" smtClean="0"/>
-              <a:t> (for named pipe creation)</a:t>
+              <a:t> (for named pipe creation</a:t>
+            </a:r>
+            <a:r>
+              <a:rPr lang="en-US" dirty="0" smtClean="0"/>
+              <a:t>)</a:t>
+            </a:r>
+          </a:p>
+          <a:p>
+            <a:r>
+              <a:rPr lang="en-US" dirty="0" err="1" smtClean="0"/>
+              <a:t>ignoreEOF</a:t>
+            </a:r>
+            <a:r>
+              <a:rPr lang="en-US" dirty="0" smtClean="0"/>
+              <a:t> (to allow </a:t>
+            </a:r>
+            <a:r>
+              <a:rPr lang="en-US" smtClean="0"/>
+              <a:t>multiple stream inputs</a:t>
+            </a:r>
+            <a:r>
+              <a:rPr lang="en-US" dirty="0" smtClean="0"/>
+              <a:t>)</a:t>
             </a:r>
             <a:endParaRPr lang="en-US" dirty="0"/>
           </a:p>

</xml_diff>